<commit_message>
kd tree example result
</commit_message>
<xml_diff>
--- a/docs_cn/tree_pictures.pptx
+++ b/docs_cn/tree_pictures.pptx
@@ -5,8 +5,9 @@
     <p:sldMasterId id="2147483648" r:id="rId1"/>
   </p:sldMasterIdLst>
   <p:sldIdLst>
-    <p:sldId id="256" r:id="rId2"/>
-    <p:sldId id="257" r:id="rId3"/>
+    <p:sldId id="257" r:id="rId2"/>
+    <p:sldId id="258" r:id="rId3"/>
+    <p:sldId id="256" r:id="rId4"/>
   </p:sldIdLst>
   <p:sldSz cx="9144000" cy="6858000" type="screen4x3"/>
   <p:notesSz cx="6858000" cy="9144000"/>
@@ -290,7 +291,7 @@
             <a:fld id="{86F288CE-15AD-4BB3-A58B-D525C4400375}" type="datetimeFigureOut">
               <a:rPr lang="zh-CN" altLang="en-US" smtClean="0"/>
               <a:pPr/>
-              <a:t>2018/9/17</a:t>
+              <a:t>2018/9/25</a:t>
             </a:fld>
             <a:endParaRPr lang="zh-CN" altLang="en-US"/>
           </a:p>
@@ -457,7 +458,7 @@
             <a:fld id="{86F288CE-15AD-4BB3-A58B-D525C4400375}" type="datetimeFigureOut">
               <a:rPr lang="zh-CN" altLang="en-US" smtClean="0"/>
               <a:pPr/>
-              <a:t>2018/9/17</a:t>
+              <a:t>2018/9/25</a:t>
             </a:fld>
             <a:endParaRPr lang="zh-CN" altLang="en-US"/>
           </a:p>
@@ -634,7 +635,7 @@
             <a:fld id="{86F288CE-15AD-4BB3-A58B-D525C4400375}" type="datetimeFigureOut">
               <a:rPr lang="zh-CN" altLang="en-US" smtClean="0"/>
               <a:pPr/>
-              <a:t>2018/9/17</a:t>
+              <a:t>2018/9/25</a:t>
             </a:fld>
             <a:endParaRPr lang="zh-CN" altLang="en-US"/>
           </a:p>
@@ -801,7 +802,7 @@
             <a:fld id="{86F288CE-15AD-4BB3-A58B-D525C4400375}" type="datetimeFigureOut">
               <a:rPr lang="zh-CN" altLang="en-US" smtClean="0"/>
               <a:pPr/>
-              <a:t>2018/9/17</a:t>
+              <a:t>2018/9/25</a:t>
             </a:fld>
             <a:endParaRPr lang="zh-CN" altLang="en-US"/>
           </a:p>
@@ -1044,7 +1045,7 @@
             <a:fld id="{86F288CE-15AD-4BB3-A58B-D525C4400375}" type="datetimeFigureOut">
               <a:rPr lang="zh-CN" altLang="en-US" smtClean="0"/>
               <a:pPr/>
-              <a:t>2018/9/17</a:t>
+              <a:t>2018/9/25</a:t>
             </a:fld>
             <a:endParaRPr lang="zh-CN" altLang="en-US"/>
           </a:p>
@@ -1329,7 +1330,7 @@
             <a:fld id="{86F288CE-15AD-4BB3-A58B-D525C4400375}" type="datetimeFigureOut">
               <a:rPr lang="zh-CN" altLang="en-US" smtClean="0"/>
               <a:pPr/>
-              <a:t>2018/9/17</a:t>
+              <a:t>2018/9/25</a:t>
             </a:fld>
             <a:endParaRPr lang="zh-CN" altLang="en-US"/>
           </a:p>
@@ -1748,7 +1749,7 @@
             <a:fld id="{86F288CE-15AD-4BB3-A58B-D525C4400375}" type="datetimeFigureOut">
               <a:rPr lang="zh-CN" altLang="en-US" smtClean="0"/>
               <a:pPr/>
-              <a:t>2018/9/17</a:t>
+              <a:t>2018/9/25</a:t>
             </a:fld>
             <a:endParaRPr lang="zh-CN" altLang="en-US"/>
           </a:p>
@@ -1863,7 +1864,7 @@
             <a:fld id="{86F288CE-15AD-4BB3-A58B-D525C4400375}" type="datetimeFigureOut">
               <a:rPr lang="zh-CN" altLang="en-US" smtClean="0"/>
               <a:pPr/>
-              <a:t>2018/9/17</a:t>
+              <a:t>2018/9/25</a:t>
             </a:fld>
             <a:endParaRPr lang="zh-CN" altLang="en-US"/>
           </a:p>
@@ -1955,7 +1956,7 @@
             <a:fld id="{86F288CE-15AD-4BB3-A58B-D525C4400375}" type="datetimeFigureOut">
               <a:rPr lang="zh-CN" altLang="en-US" smtClean="0"/>
               <a:pPr/>
-              <a:t>2018/9/17</a:t>
+              <a:t>2018/9/25</a:t>
             </a:fld>
             <a:endParaRPr lang="zh-CN" altLang="en-US"/>
           </a:p>
@@ -2229,7 +2230,7 @@
             <a:fld id="{86F288CE-15AD-4BB3-A58B-D525C4400375}" type="datetimeFigureOut">
               <a:rPr lang="zh-CN" altLang="en-US" smtClean="0"/>
               <a:pPr/>
-              <a:t>2018/9/17</a:t>
+              <a:t>2018/9/25</a:t>
             </a:fld>
             <a:endParaRPr lang="zh-CN" altLang="en-US"/>
           </a:p>
@@ -2479,7 +2480,7 @@
             <a:fld id="{86F288CE-15AD-4BB3-A58B-D525C4400375}" type="datetimeFigureOut">
               <a:rPr lang="zh-CN" altLang="en-US" smtClean="0"/>
               <a:pPr/>
-              <a:t>2018/9/17</a:t>
+              <a:t>2018/9/25</a:t>
             </a:fld>
             <a:endParaRPr lang="zh-CN" altLang="en-US"/>
           </a:p>
@@ -2689,7 +2690,7 @@
             <a:fld id="{86F288CE-15AD-4BB3-A58B-D525C4400375}" type="datetimeFigureOut">
               <a:rPr lang="zh-CN" altLang="en-US" smtClean="0"/>
               <a:pPr/>
-              <a:t>2018/9/17</a:t>
+              <a:t>2018/9/25</a:t>
             </a:fld>
             <a:endParaRPr lang="zh-CN" altLang="en-US"/>
           </a:p>
@@ -3060,776 +3061,477 @@
           <a:chExt cx="0" cy="0"/>
         </a:xfrm>
       </p:grpSpPr>
-      <p:grpSp>
-        <p:nvGrpSpPr>
-          <p:cNvPr id="25" name="组合 24"/>
-          <p:cNvGrpSpPr/>
+      <p:sp>
+        <p:nvSpPr>
+          <p:cNvPr id="4" name="椭圆 3"/>
+          <p:cNvSpPr/>
           <p:nvPr/>
-        </p:nvGrpSpPr>
-        <p:grpSpPr>
-          <a:xfrm>
-            <a:off x="467544" y="1628800"/>
-            <a:ext cx="8244408" cy="4464496"/>
-            <a:chOff x="467544" y="1628800"/>
-            <a:chExt cx="8244408" cy="4464496"/>
-          </a:xfrm>
-        </p:grpSpPr>
-        <p:sp>
-          <p:nvSpPr>
-            <p:cNvPr id="4" name="椭圆 3"/>
-            <p:cNvSpPr/>
-            <p:nvPr/>
-          </p:nvSpPr>
-          <p:spPr>
-            <a:xfrm>
-              <a:off x="3779912" y="1628800"/>
-              <a:ext cx="1512168" cy="720080"/>
-            </a:xfrm>
-            <a:prstGeom prst="ellipse">
-              <a:avLst/>
-            </a:prstGeom>
-          </p:spPr>
-          <p:style>
-            <a:lnRef idx="2">
-              <a:schemeClr val="accent1"/>
-            </a:lnRef>
-            <a:fillRef idx="1">
-              <a:schemeClr val="lt1"/>
-            </a:fillRef>
-            <a:effectRef idx="0">
-              <a:schemeClr val="accent1"/>
-            </a:effectRef>
-            <a:fontRef idx="minor">
-              <a:schemeClr val="dk1"/>
-            </a:fontRef>
-          </p:style>
-          <p:txBody>
-            <a:bodyPr rtlCol="0" anchor="ctr"/>
-            <a:lstStyle/>
-            <a:p>
-              <a:pPr algn="ctr"/>
-              <a:r>
-                <a:rPr lang="en-US" altLang="zh-CN" b="1" dirty="0" smtClean="0"/>
-                <a:t>[10, 4, 3]</a:t>
-              </a:r>
-              <a:endParaRPr lang="en-US" altLang="zh-CN" dirty="0" smtClean="0"/>
-            </a:p>
-          </p:txBody>
-        </p:sp>
-        <p:sp>
-          <p:nvSpPr>
-            <p:cNvPr id="5" name="椭圆 4"/>
-            <p:cNvSpPr/>
-            <p:nvPr/>
-          </p:nvSpPr>
-          <p:spPr>
-            <a:xfrm>
-              <a:off x="2123728" y="2492896"/>
-              <a:ext cx="1512168" cy="720080"/>
-            </a:xfrm>
-            <a:prstGeom prst="ellipse">
-              <a:avLst/>
-            </a:prstGeom>
-          </p:spPr>
-          <p:style>
-            <a:lnRef idx="2">
-              <a:schemeClr val="accent1"/>
-            </a:lnRef>
-            <a:fillRef idx="1">
-              <a:schemeClr val="lt1"/>
-            </a:fillRef>
-            <a:effectRef idx="0">
-              <a:schemeClr val="accent1"/>
-            </a:effectRef>
-            <a:fontRef idx="minor">
-              <a:schemeClr val="dk1"/>
-            </a:fontRef>
-          </p:style>
-          <p:txBody>
-            <a:bodyPr rtlCol="0" anchor="ctr"/>
-            <a:lstStyle/>
-            <a:p>
-              <a:pPr algn="ctr"/>
-              <a:r>
-                <a:rPr lang="en-US" altLang="zh-CN" b="1" dirty="0" smtClean="0"/>
-                <a:t>[6, 9, 1]</a:t>
-              </a:r>
-              <a:endParaRPr lang="zh-CN" altLang="en-US" dirty="0"/>
-            </a:p>
-          </p:txBody>
-        </p:sp>
-        <p:sp>
-          <p:nvSpPr>
-            <p:cNvPr id="6" name="椭圆 5"/>
-            <p:cNvSpPr/>
-            <p:nvPr/>
-          </p:nvSpPr>
-          <p:spPr>
-            <a:xfrm>
-              <a:off x="5868144" y="2708920"/>
-              <a:ext cx="1512168" cy="720080"/>
-            </a:xfrm>
-            <a:prstGeom prst="ellipse">
-              <a:avLst/>
-            </a:prstGeom>
-          </p:spPr>
-          <p:style>
-            <a:lnRef idx="2">
-              <a:schemeClr val="accent1"/>
-            </a:lnRef>
-            <a:fillRef idx="1">
-              <a:schemeClr val="lt1"/>
-            </a:fillRef>
-            <a:effectRef idx="0">
-              <a:schemeClr val="accent1"/>
-            </a:effectRef>
-            <a:fontRef idx="minor">
-              <a:schemeClr val="dk1"/>
-            </a:fontRef>
-          </p:style>
-          <p:txBody>
-            <a:bodyPr rtlCol="0" anchor="ctr"/>
-            <a:lstStyle/>
-            <a:p>
-              <a:pPr algn="ctr"/>
-              <a:r>
-                <a:rPr lang="en-US" altLang="zh-CN" dirty="0" smtClean="0"/>
-                <a:t>[9, 10, 9]</a:t>
-              </a:r>
-              <a:endParaRPr lang="zh-CN" altLang="en-US" dirty="0"/>
-            </a:p>
-          </p:txBody>
-        </p:sp>
-        <p:sp>
-          <p:nvSpPr>
-            <p:cNvPr id="8" name="椭圆 7"/>
-            <p:cNvSpPr/>
-            <p:nvPr/>
-          </p:nvSpPr>
-          <p:spPr>
-            <a:xfrm>
-              <a:off x="467544" y="3789040"/>
-              <a:ext cx="1512168" cy="720080"/>
-            </a:xfrm>
-            <a:prstGeom prst="ellipse">
-              <a:avLst/>
-            </a:prstGeom>
-          </p:spPr>
-          <p:style>
-            <a:lnRef idx="2">
-              <a:schemeClr val="accent1"/>
-            </a:lnRef>
-            <a:fillRef idx="1">
-              <a:schemeClr val="lt1"/>
-            </a:fillRef>
-            <a:effectRef idx="0">
-              <a:schemeClr val="accent1"/>
-            </a:effectRef>
-            <a:fontRef idx="minor">
-              <a:schemeClr val="dk1"/>
-            </a:fontRef>
-          </p:style>
-          <p:txBody>
-            <a:bodyPr rtlCol="0" anchor="ctr"/>
-            <a:lstStyle/>
-            <a:p>
-              <a:pPr algn="ctr"/>
-              <a:r>
-                <a:rPr lang="en-US" altLang="zh-CN" dirty="0" smtClean="0"/>
-                <a:t>0, 7, 4</a:t>
-              </a:r>
-              <a:endParaRPr lang="zh-CN" altLang="en-US" dirty="0"/>
-            </a:p>
-          </p:txBody>
-        </p:sp>
-        <p:sp>
-          <p:nvSpPr>
-            <p:cNvPr id="9" name="椭圆 8"/>
-            <p:cNvSpPr/>
-            <p:nvPr/>
-          </p:nvSpPr>
-          <p:spPr>
-            <a:xfrm>
-              <a:off x="2699792" y="3789040"/>
-              <a:ext cx="1512168" cy="720080"/>
-            </a:xfrm>
-            <a:prstGeom prst="ellipse">
-              <a:avLst/>
-            </a:prstGeom>
-          </p:spPr>
-          <p:style>
-            <a:lnRef idx="2">
-              <a:schemeClr val="accent1"/>
-            </a:lnRef>
-            <a:fillRef idx="1">
-              <a:schemeClr val="lt1"/>
-            </a:fillRef>
-            <a:effectRef idx="0">
-              <a:schemeClr val="accent1"/>
-            </a:effectRef>
-            <a:fontRef idx="minor">
-              <a:schemeClr val="dk1"/>
-            </a:fontRef>
-          </p:style>
-          <p:txBody>
-            <a:bodyPr rtlCol="0" anchor="ctr"/>
-            <a:lstStyle/>
-            <a:p>
-              <a:pPr algn="ctr"/>
-              <a:r>
-                <a:rPr lang="en-US" altLang="zh-CN" b="1" dirty="0" smtClean="0"/>
-                <a:t>5</a:t>
-              </a:r>
-              <a:r>
-                <a:rPr lang="en-US" altLang="zh-CN" dirty="0" smtClean="0"/>
-                <a:t>, 10, 5</a:t>
-              </a:r>
-              <a:endParaRPr lang="zh-CN" altLang="en-US" dirty="0"/>
-            </a:p>
-          </p:txBody>
-        </p:sp>
-        <p:sp>
-          <p:nvSpPr>
-            <p:cNvPr id="10" name="椭圆 9"/>
-            <p:cNvSpPr/>
-            <p:nvPr/>
-          </p:nvSpPr>
-          <p:spPr>
-            <a:xfrm>
-              <a:off x="4644008" y="3861048"/>
-              <a:ext cx="1512168" cy="720080"/>
-            </a:xfrm>
-            <a:prstGeom prst="ellipse">
-              <a:avLst/>
-            </a:prstGeom>
-          </p:spPr>
-          <p:style>
-            <a:lnRef idx="2">
-              <a:schemeClr val="accent1"/>
-            </a:lnRef>
-            <a:fillRef idx="1">
-              <a:schemeClr val="lt1"/>
-            </a:fillRef>
-            <a:effectRef idx="0">
-              <a:schemeClr val="accent1"/>
-            </a:effectRef>
-            <a:fontRef idx="minor">
-              <a:schemeClr val="dk1"/>
-            </a:fontRef>
-          </p:style>
-          <p:txBody>
-            <a:bodyPr rtlCol="0" anchor="ctr"/>
-            <a:lstStyle/>
-            <a:p>
-              <a:pPr algn="ctr"/>
-              <a:r>
-                <a:rPr lang="en-US" altLang="zh-CN" dirty="0" smtClean="0"/>
-                <a:t>8, 0, 8</a:t>
-              </a:r>
-              <a:endParaRPr lang="zh-CN" altLang="en-US" dirty="0"/>
-            </a:p>
-          </p:txBody>
-        </p:sp>
-        <p:sp>
-          <p:nvSpPr>
-            <p:cNvPr id="11" name="椭圆 10"/>
-            <p:cNvSpPr/>
-            <p:nvPr/>
-          </p:nvSpPr>
-          <p:spPr>
-            <a:xfrm>
-              <a:off x="6948264" y="3861048"/>
-              <a:ext cx="1512168" cy="720080"/>
-            </a:xfrm>
-            <a:prstGeom prst="ellipse">
-              <a:avLst/>
-            </a:prstGeom>
-          </p:spPr>
-          <p:style>
-            <a:lnRef idx="2">
-              <a:schemeClr val="accent1"/>
-            </a:lnRef>
-            <a:fillRef idx="1">
-              <a:schemeClr val="lt1"/>
-            </a:fillRef>
-            <a:effectRef idx="0">
-              <a:schemeClr val="accent1"/>
-            </a:effectRef>
-            <a:fontRef idx="minor">
-              <a:schemeClr val="dk1"/>
-            </a:fontRef>
-          </p:style>
-          <p:txBody>
-            <a:bodyPr rtlCol="0" anchor="ctr"/>
-            <a:lstStyle/>
-            <a:p>
-              <a:pPr algn="ctr"/>
-              <a:r>
-                <a:rPr lang="en-US" altLang="zh-CN" dirty="0" smtClean="0"/>
-                <a:t>8, 7, </a:t>
-              </a:r>
-              <a:r>
-                <a:rPr lang="en-US" altLang="zh-CN" b="1" dirty="0" smtClean="0"/>
-                <a:t>8</a:t>
-              </a:r>
-            </a:p>
-          </p:txBody>
-        </p:sp>
-        <p:sp>
-          <p:nvSpPr>
-            <p:cNvPr id="12" name="椭圆 11"/>
-            <p:cNvSpPr/>
-            <p:nvPr/>
-          </p:nvSpPr>
-          <p:spPr>
-            <a:xfrm>
-              <a:off x="2195736" y="5301208"/>
-              <a:ext cx="1512168" cy="720080"/>
-            </a:xfrm>
-            <a:prstGeom prst="ellipse">
-              <a:avLst/>
-            </a:prstGeom>
-          </p:spPr>
-          <p:style>
-            <a:lnRef idx="2">
-              <a:schemeClr val="accent1"/>
-            </a:lnRef>
-            <a:fillRef idx="1">
-              <a:schemeClr val="lt1"/>
-            </a:fillRef>
-            <a:effectRef idx="0">
-              <a:schemeClr val="accent1"/>
-            </a:effectRef>
-            <a:fontRef idx="minor">
-              <a:schemeClr val="dk1"/>
-            </a:fontRef>
-          </p:style>
-          <p:txBody>
-            <a:bodyPr rtlCol="0" anchor="ctr"/>
-            <a:lstStyle/>
-            <a:p>
-              <a:pPr algn="ctr"/>
-              <a:r>
-                <a:rPr lang="en-US" altLang="zh-CN" dirty="0" smtClean="0"/>
-                <a:t>1, 7, 3</a:t>
-              </a:r>
-              <a:endParaRPr lang="zh-CN" altLang="en-US" dirty="0"/>
-            </a:p>
-          </p:txBody>
-        </p:sp>
-        <p:sp>
-          <p:nvSpPr>
-            <p:cNvPr id="13" name="椭圆 12"/>
-            <p:cNvSpPr/>
-            <p:nvPr/>
-          </p:nvSpPr>
-          <p:spPr>
-            <a:xfrm>
-              <a:off x="4932040" y="5373216"/>
-              <a:ext cx="1512168" cy="720080"/>
-            </a:xfrm>
-            <a:prstGeom prst="ellipse">
-              <a:avLst/>
-            </a:prstGeom>
-          </p:spPr>
-          <p:style>
-            <a:lnRef idx="2">
-              <a:schemeClr val="accent1"/>
-            </a:lnRef>
-            <a:fillRef idx="1">
-              <a:schemeClr val="lt1"/>
-            </a:fillRef>
-            <a:effectRef idx="0">
-              <a:schemeClr val="accent1"/>
-            </a:effectRef>
-            <a:fontRef idx="minor">
-              <a:schemeClr val="dk1"/>
-            </a:fontRef>
-          </p:style>
-          <p:txBody>
-            <a:bodyPr rtlCol="0" anchor="ctr"/>
-            <a:lstStyle/>
-            <a:p>
-              <a:pPr algn="ctr"/>
-              <a:r>
-                <a:rPr lang="en-US" altLang="zh-CN" dirty="0" smtClean="0"/>
-                <a:t>9, 9, 5</a:t>
-              </a:r>
-              <a:endParaRPr lang="zh-CN" altLang="en-US" dirty="0"/>
-            </a:p>
-          </p:txBody>
-        </p:sp>
-        <p:sp>
-          <p:nvSpPr>
-            <p:cNvPr id="14" name="椭圆 13"/>
-            <p:cNvSpPr/>
-            <p:nvPr/>
-          </p:nvSpPr>
-          <p:spPr>
-            <a:xfrm>
-              <a:off x="7199784" y="5229200"/>
-              <a:ext cx="1512168" cy="720080"/>
-            </a:xfrm>
-            <a:prstGeom prst="ellipse">
-              <a:avLst/>
-            </a:prstGeom>
-          </p:spPr>
-          <p:style>
-            <a:lnRef idx="2">
-              <a:schemeClr val="accent1"/>
-            </a:lnRef>
-            <a:fillRef idx="1">
-              <a:schemeClr val="lt1"/>
-            </a:fillRef>
-            <a:effectRef idx="0">
-              <a:schemeClr val="accent1"/>
-            </a:effectRef>
-            <a:fontRef idx="minor">
-              <a:schemeClr val="dk1"/>
-            </a:fontRef>
-          </p:style>
-          <p:txBody>
-            <a:bodyPr rtlCol="0" anchor="ctr"/>
-            <a:lstStyle/>
-            <a:p>
-              <a:pPr algn="ctr"/>
-              <a:r>
-                <a:rPr lang="en-US" altLang="zh-CN" dirty="0" smtClean="0"/>
-                <a:t>9, 6, 9</a:t>
-              </a:r>
-              <a:endParaRPr lang="zh-CN" altLang="en-US" dirty="0"/>
-            </a:p>
-          </p:txBody>
-        </p:sp>
-        <p:cxnSp>
-          <p:nvCxnSpPr>
-            <p:cNvPr id="16" name="直接连接符 15"/>
-            <p:cNvCxnSpPr>
-              <a:stCxn id="4" idx="4"/>
-              <a:endCxn id="5" idx="0"/>
-            </p:cNvCxnSpPr>
-            <p:nvPr/>
-          </p:nvCxnSpPr>
-          <p:spPr>
-            <a:xfrm flipH="1">
-              <a:off x="2879812" y="2348880"/>
-              <a:ext cx="1656184" cy="144016"/>
-            </a:xfrm>
-            <a:prstGeom prst="line">
-              <a:avLst/>
-            </a:prstGeom>
-          </p:spPr>
-          <p:style>
-            <a:lnRef idx="1">
-              <a:schemeClr val="accent1"/>
-            </a:lnRef>
-            <a:fillRef idx="0">
-              <a:schemeClr val="accent1"/>
-            </a:fillRef>
-            <a:effectRef idx="0">
-              <a:schemeClr val="accent1"/>
-            </a:effectRef>
-            <a:fontRef idx="minor">
-              <a:schemeClr val="tx1"/>
-            </a:fontRef>
-          </p:style>
-        </p:cxnSp>
-        <p:cxnSp>
-          <p:nvCxnSpPr>
-            <p:cNvPr id="18" name="直接连接符 17"/>
-            <p:cNvCxnSpPr>
-              <a:stCxn id="5" idx="4"/>
-              <a:endCxn id="8" idx="0"/>
-            </p:cNvCxnSpPr>
-            <p:nvPr/>
-          </p:nvCxnSpPr>
-          <p:spPr>
-            <a:xfrm flipH="1">
-              <a:off x="1223628" y="3212976"/>
-              <a:ext cx="1656184" cy="576064"/>
-            </a:xfrm>
-            <a:prstGeom prst="line">
-              <a:avLst/>
-            </a:prstGeom>
-          </p:spPr>
-          <p:style>
-            <a:lnRef idx="1">
-              <a:schemeClr val="accent1"/>
-            </a:lnRef>
-            <a:fillRef idx="0">
-              <a:schemeClr val="accent1"/>
-            </a:fillRef>
-            <a:effectRef idx="0">
-              <a:schemeClr val="accent1"/>
-            </a:effectRef>
-            <a:fontRef idx="minor">
-              <a:schemeClr val="tx1"/>
-            </a:fontRef>
-          </p:style>
-        </p:cxnSp>
-        <p:cxnSp>
-          <p:nvCxnSpPr>
-            <p:cNvPr id="20" name="直接连接符 19"/>
-            <p:cNvCxnSpPr>
-              <a:stCxn id="5" idx="4"/>
-              <a:endCxn id="9" idx="0"/>
-            </p:cNvCxnSpPr>
-            <p:nvPr/>
-          </p:nvCxnSpPr>
-          <p:spPr>
-            <a:xfrm>
-              <a:off x="2879812" y="3212976"/>
-              <a:ext cx="576064" cy="576064"/>
-            </a:xfrm>
-            <a:prstGeom prst="line">
-              <a:avLst/>
-            </a:prstGeom>
-          </p:spPr>
-          <p:style>
-            <a:lnRef idx="1">
-              <a:schemeClr val="accent1"/>
-            </a:lnRef>
-            <a:fillRef idx="0">
-              <a:schemeClr val="accent1"/>
-            </a:fillRef>
-            <a:effectRef idx="0">
-              <a:schemeClr val="accent1"/>
-            </a:effectRef>
-            <a:fontRef idx="minor">
-              <a:schemeClr val="tx1"/>
-            </a:fontRef>
-          </p:style>
-        </p:cxnSp>
-        <p:cxnSp>
-          <p:nvCxnSpPr>
-            <p:cNvPr id="22" name="直接连接符 21"/>
-            <p:cNvCxnSpPr>
-              <a:stCxn id="6" idx="4"/>
-              <a:endCxn id="10" idx="0"/>
-            </p:cNvCxnSpPr>
-            <p:nvPr/>
-          </p:nvCxnSpPr>
-          <p:spPr>
-            <a:xfrm flipH="1">
-              <a:off x="5400092" y="3429000"/>
-              <a:ext cx="1224136" cy="432048"/>
-            </a:xfrm>
-            <a:prstGeom prst="line">
-              <a:avLst/>
-            </a:prstGeom>
-          </p:spPr>
-          <p:style>
-            <a:lnRef idx="1">
-              <a:schemeClr val="accent1"/>
-            </a:lnRef>
-            <a:fillRef idx="0">
-              <a:schemeClr val="accent1"/>
-            </a:fillRef>
-            <a:effectRef idx="0">
-              <a:schemeClr val="accent1"/>
-            </a:effectRef>
-            <a:fontRef idx="minor">
-              <a:schemeClr val="tx1"/>
-            </a:fontRef>
-          </p:style>
-        </p:cxnSp>
-        <p:cxnSp>
-          <p:nvCxnSpPr>
-            <p:cNvPr id="24" name="直接连接符 23"/>
-            <p:cNvCxnSpPr>
-              <a:stCxn id="6" idx="4"/>
-              <a:endCxn id="11" idx="0"/>
-            </p:cNvCxnSpPr>
-            <p:nvPr/>
-          </p:nvCxnSpPr>
-          <p:spPr>
-            <a:xfrm>
-              <a:off x="6624228" y="3429000"/>
-              <a:ext cx="1080120" cy="432048"/>
-            </a:xfrm>
-            <a:prstGeom prst="line">
-              <a:avLst/>
-            </a:prstGeom>
-          </p:spPr>
-          <p:style>
-            <a:lnRef idx="1">
-              <a:schemeClr val="accent1"/>
-            </a:lnRef>
-            <a:fillRef idx="0">
-              <a:schemeClr val="accent1"/>
-            </a:fillRef>
-            <a:effectRef idx="0">
-              <a:schemeClr val="accent1"/>
-            </a:effectRef>
-            <a:fontRef idx="minor">
-              <a:schemeClr val="tx1"/>
-            </a:fontRef>
-          </p:style>
-        </p:cxnSp>
-        <p:cxnSp>
-          <p:nvCxnSpPr>
-            <p:cNvPr id="26" name="直接连接符 25"/>
-            <p:cNvCxnSpPr>
-              <a:stCxn id="4" idx="4"/>
-              <a:endCxn id="6" idx="0"/>
-            </p:cNvCxnSpPr>
-            <p:nvPr/>
-          </p:nvCxnSpPr>
-          <p:spPr>
-            <a:xfrm>
-              <a:off x="4535996" y="2348880"/>
-              <a:ext cx="2088232" cy="360040"/>
-            </a:xfrm>
-            <a:prstGeom prst="line">
-              <a:avLst/>
-            </a:prstGeom>
-          </p:spPr>
-          <p:style>
-            <a:lnRef idx="1">
-              <a:schemeClr val="accent1"/>
-            </a:lnRef>
-            <a:fillRef idx="0">
-              <a:schemeClr val="accent1"/>
-            </a:fillRef>
-            <a:effectRef idx="0">
-              <a:schemeClr val="accent1"/>
-            </a:effectRef>
-            <a:fontRef idx="minor">
-              <a:schemeClr val="tx1"/>
-            </a:fontRef>
-          </p:style>
-        </p:cxnSp>
-        <p:cxnSp>
-          <p:nvCxnSpPr>
-            <p:cNvPr id="28" name="直接连接符 27"/>
-            <p:cNvCxnSpPr>
-              <a:stCxn id="9" idx="4"/>
-              <a:endCxn id="12" idx="0"/>
-            </p:cNvCxnSpPr>
-            <p:nvPr/>
-          </p:nvCxnSpPr>
-          <p:spPr>
-            <a:xfrm flipH="1">
-              <a:off x="2951820" y="4509120"/>
-              <a:ext cx="504056" cy="792088"/>
-            </a:xfrm>
-            <a:prstGeom prst="line">
-              <a:avLst/>
-            </a:prstGeom>
-          </p:spPr>
-          <p:style>
-            <a:lnRef idx="1">
-              <a:schemeClr val="accent1"/>
-            </a:lnRef>
-            <a:fillRef idx="0">
-              <a:schemeClr val="accent1"/>
-            </a:fillRef>
-            <a:effectRef idx="0">
-              <a:schemeClr val="accent1"/>
-            </a:effectRef>
-            <a:fontRef idx="minor">
-              <a:schemeClr val="tx1"/>
-            </a:fontRef>
-          </p:style>
-        </p:cxnSp>
-        <p:cxnSp>
-          <p:nvCxnSpPr>
-            <p:cNvPr id="30" name="直接连接符 29"/>
-            <p:cNvCxnSpPr>
-              <a:stCxn id="11" idx="4"/>
-              <a:endCxn id="13" idx="0"/>
-            </p:cNvCxnSpPr>
-            <p:nvPr/>
-          </p:nvCxnSpPr>
-          <p:spPr>
-            <a:xfrm flipH="1">
-              <a:off x="5688124" y="4581128"/>
-              <a:ext cx="2016224" cy="792088"/>
-            </a:xfrm>
-            <a:prstGeom prst="line">
-              <a:avLst/>
-            </a:prstGeom>
-          </p:spPr>
-          <p:style>
-            <a:lnRef idx="1">
-              <a:schemeClr val="accent1"/>
-            </a:lnRef>
-            <a:fillRef idx="0">
-              <a:schemeClr val="accent1"/>
-            </a:fillRef>
-            <a:effectRef idx="0">
-              <a:schemeClr val="accent1"/>
-            </a:effectRef>
-            <a:fontRef idx="minor">
-              <a:schemeClr val="tx1"/>
-            </a:fontRef>
-          </p:style>
-        </p:cxnSp>
-        <p:cxnSp>
-          <p:nvCxnSpPr>
-            <p:cNvPr id="33" name="直接连接符 32"/>
-            <p:cNvCxnSpPr>
-              <a:stCxn id="11" idx="4"/>
-              <a:endCxn id="14" idx="0"/>
-            </p:cNvCxnSpPr>
-            <p:nvPr/>
-          </p:nvCxnSpPr>
-          <p:spPr>
-            <a:xfrm>
-              <a:off x="7704348" y="4581128"/>
-              <a:ext cx="251520" cy="648072"/>
-            </a:xfrm>
-            <a:prstGeom prst="line">
-              <a:avLst/>
-            </a:prstGeom>
-          </p:spPr>
-          <p:style>
-            <a:lnRef idx="1">
-              <a:schemeClr val="accent1"/>
-            </a:lnRef>
-            <a:fillRef idx="0">
-              <a:schemeClr val="accent1"/>
-            </a:fillRef>
-            <a:effectRef idx="0">
-              <a:schemeClr val="accent1"/>
-            </a:effectRef>
-            <a:fontRef idx="minor">
-              <a:schemeClr val="tx1"/>
-            </a:fontRef>
-          </p:style>
-        </p:cxnSp>
-      </p:grpSp>
-      <p:sp>
-        <p:nvSpPr>
-          <p:cNvPr id="23" name="TextBox 22"/>
-          <p:cNvSpPr txBox="1"/>
-          <p:nvPr/>
-        </p:nvSpPr>
-        <p:spPr>
-          <a:xfrm>
-            <a:off x="611560" y="620688"/>
-            <a:ext cx="3600400" cy="646331"/>
-          </a:xfrm>
-          <a:prstGeom prst="rect">
+        </p:nvSpPr>
+        <p:spPr>
+          <a:xfrm>
+            <a:off x="3779912" y="2060848"/>
+            <a:ext cx="1512168" cy="720080"/>
+          </a:xfrm>
+          <a:prstGeom prst="ellipse">
             <a:avLst/>
           </a:prstGeom>
-          <a:noFill/>
-        </p:spPr>
-        <p:txBody>
-          <a:bodyPr wrap="square" rtlCol="0">
-            <a:spAutoFit/>
-          </a:bodyPr>
-          <a:lstStyle/>
-          <a:p>
+        </p:spPr>
+        <p:style>
+          <a:lnRef idx="2">
+            <a:schemeClr val="accent1"/>
+          </a:lnRef>
+          <a:fillRef idx="1">
+            <a:schemeClr val="lt1"/>
+          </a:fillRef>
+          <a:effectRef idx="0">
+            <a:schemeClr val="accent1"/>
+          </a:effectRef>
+          <a:fontRef idx="minor">
+            <a:schemeClr val="dk1"/>
+          </a:fontRef>
+        </p:style>
+        <p:txBody>
+          <a:bodyPr rtlCol="0" anchor="ctr"/>
+          <a:lstStyle/>
+          <a:p>
+            <a:pPr algn="ctr"/>
             <a:r>
               <a:rPr lang="en-US" altLang="zh-CN" dirty="0" smtClean="0"/>
-              <a:t>Target: [10, 9, 1]</a:t>
-            </a:r>
-          </a:p>
-          <a:p>
+              <a:t>Index: 1</a:t>
+            </a:r>
+          </a:p>
+          <a:p>
+            <a:pPr algn="ctr"/>
             <a:r>
               <a:rPr lang="en-US" altLang="zh-CN" dirty="0" smtClean="0"/>
-              <a:t>Expect: [8, 7, 0]</a:t>
+              <a:t>Value: 6</a:t>
+            </a:r>
+          </a:p>
+        </p:txBody>
+      </p:sp>
+      <p:sp>
+        <p:nvSpPr>
+          <p:cNvPr id="5" name="椭圆 4"/>
+          <p:cNvSpPr/>
+          <p:nvPr/>
+        </p:nvSpPr>
+        <p:spPr>
+          <a:xfrm>
+            <a:off x="2195736" y="3429000"/>
+            <a:ext cx="1512168" cy="720080"/>
+          </a:xfrm>
+          <a:prstGeom prst="ellipse">
+            <a:avLst/>
+          </a:prstGeom>
+        </p:spPr>
+        <p:style>
+          <a:lnRef idx="2">
+            <a:schemeClr val="accent1"/>
+          </a:lnRef>
+          <a:fillRef idx="1">
+            <a:schemeClr val="lt1"/>
+          </a:fillRef>
+          <a:effectRef idx="0">
+            <a:schemeClr val="accent1"/>
+          </a:effectRef>
+          <a:fontRef idx="minor">
+            <a:schemeClr val="dk1"/>
+          </a:fontRef>
+        </p:style>
+        <p:txBody>
+          <a:bodyPr rtlCol="0" anchor="ctr"/>
+          <a:lstStyle/>
+          <a:p>
+            <a:pPr algn="ctr"/>
+            <a:r>
+              <a:rPr lang="en-US" altLang="zh-CN" dirty="0" smtClean="0"/>
+              <a:t>Index: 2</a:t>
+            </a:r>
+          </a:p>
+          <a:p>
+            <a:pPr algn="ctr"/>
+            <a:r>
+              <a:rPr lang="en-US" altLang="zh-CN" dirty="0" smtClean="0"/>
+              <a:t>Value: 4</a:t>
+            </a:r>
+          </a:p>
+        </p:txBody>
+      </p:sp>
+      <p:sp>
+        <p:nvSpPr>
+          <p:cNvPr id="6" name="椭圆 5"/>
+          <p:cNvSpPr/>
+          <p:nvPr/>
+        </p:nvSpPr>
+        <p:spPr>
+          <a:xfrm>
+            <a:off x="5508104" y="3573016"/>
+            <a:ext cx="1512168" cy="720080"/>
+          </a:xfrm>
+          <a:prstGeom prst="ellipse">
+            <a:avLst/>
+          </a:prstGeom>
+        </p:spPr>
+        <p:style>
+          <a:lnRef idx="2">
+            <a:schemeClr val="accent1"/>
+          </a:lnRef>
+          <a:fillRef idx="1">
+            <a:schemeClr val="lt1"/>
+          </a:fillRef>
+          <a:effectRef idx="0">
+            <a:schemeClr val="accent1"/>
+          </a:effectRef>
+          <a:fontRef idx="minor">
+            <a:schemeClr val="dk1"/>
+          </a:fontRef>
+        </p:style>
+        <p:txBody>
+          <a:bodyPr rtlCol="0" anchor="ctr"/>
+          <a:lstStyle/>
+          <a:p>
+            <a:pPr algn="ctr"/>
+            <a:r>
+              <a:rPr lang="en-US" altLang="zh-CN" dirty="0" smtClean="0"/>
+              <a:t>Index: 3</a:t>
+            </a:r>
+          </a:p>
+          <a:p>
+            <a:pPr algn="ctr"/>
+            <a:r>
+              <a:rPr lang="en-US" altLang="zh-CN" dirty="0" smtClean="0"/>
+              <a:t>Value: 5</a:t>
+            </a:r>
+          </a:p>
+        </p:txBody>
+      </p:sp>
+      <p:sp>
+        <p:nvSpPr>
+          <p:cNvPr id="8" name="椭圆 7"/>
+          <p:cNvSpPr/>
+          <p:nvPr/>
+        </p:nvSpPr>
+        <p:spPr>
+          <a:xfrm>
+            <a:off x="971600" y="5085184"/>
+            <a:ext cx="1512168" cy="720080"/>
+          </a:xfrm>
+          <a:prstGeom prst="ellipse">
+            <a:avLst/>
+          </a:prstGeom>
+        </p:spPr>
+        <p:style>
+          <a:lnRef idx="2">
+            <a:schemeClr val="accent1"/>
+          </a:lnRef>
+          <a:fillRef idx="1">
+            <a:schemeClr val="lt1"/>
+          </a:fillRef>
+          <a:effectRef idx="0">
+            <a:schemeClr val="accent1"/>
+          </a:effectRef>
+          <a:fontRef idx="minor">
+            <a:schemeClr val="dk1"/>
+          </a:fontRef>
+        </p:style>
+        <p:txBody>
+          <a:bodyPr rtlCol="0" anchor="ctr"/>
+          <a:lstStyle/>
+          <a:p>
+            <a:pPr algn="ctr"/>
+            <a:r>
+              <a:rPr lang="en-US" altLang="zh-CN" dirty="0" smtClean="0"/>
+              <a:t>Index: 4</a:t>
+            </a:r>
+          </a:p>
+          <a:p>
+            <a:pPr algn="ctr"/>
+            <a:r>
+              <a:rPr lang="en-US" altLang="zh-CN" dirty="0" smtClean="0"/>
+              <a:t>Value: 1</a:t>
+            </a:r>
+          </a:p>
+        </p:txBody>
+      </p:sp>
+      <p:sp>
+        <p:nvSpPr>
+          <p:cNvPr id="9" name="椭圆 8"/>
+          <p:cNvSpPr/>
+          <p:nvPr/>
+        </p:nvSpPr>
+        <p:spPr>
+          <a:xfrm>
+            <a:off x="2843808" y="5157192"/>
+            <a:ext cx="1512168" cy="720080"/>
+          </a:xfrm>
+          <a:prstGeom prst="ellipse">
+            <a:avLst/>
+          </a:prstGeom>
+        </p:spPr>
+        <p:style>
+          <a:lnRef idx="2">
+            <a:schemeClr val="accent1"/>
+          </a:lnRef>
+          <a:fillRef idx="1">
+            <a:schemeClr val="lt1"/>
+          </a:fillRef>
+          <a:effectRef idx="0">
+            <a:schemeClr val="accent1"/>
+          </a:effectRef>
+          <a:fontRef idx="minor">
+            <a:schemeClr val="dk1"/>
+          </a:fontRef>
+        </p:style>
+        <p:txBody>
+          <a:bodyPr rtlCol="0" anchor="ctr"/>
+          <a:lstStyle/>
+          <a:p>
+            <a:pPr algn="ctr"/>
+            <a:r>
+              <a:rPr lang="en-US" altLang="zh-CN" dirty="0" smtClean="0"/>
+              <a:t>Index: 5</a:t>
+            </a:r>
+          </a:p>
+          <a:p>
+            <a:pPr algn="ctr"/>
+            <a:r>
+              <a:rPr lang="en-US" altLang="zh-CN" dirty="0" smtClean="0"/>
+              <a:t>Value: 2</a:t>
+            </a:r>
+          </a:p>
+        </p:txBody>
+      </p:sp>
+      <p:sp>
+        <p:nvSpPr>
+          <p:cNvPr id="10" name="椭圆 9"/>
+          <p:cNvSpPr/>
+          <p:nvPr/>
+        </p:nvSpPr>
+        <p:spPr>
+          <a:xfrm>
+            <a:off x="4788024" y="5013176"/>
+            <a:ext cx="1512168" cy="720080"/>
+          </a:xfrm>
+          <a:prstGeom prst="ellipse">
+            <a:avLst/>
+          </a:prstGeom>
+        </p:spPr>
+        <p:style>
+          <a:lnRef idx="2">
+            <a:schemeClr val="accent1"/>
+          </a:lnRef>
+          <a:fillRef idx="1">
+            <a:schemeClr val="lt1"/>
+          </a:fillRef>
+          <a:effectRef idx="0">
+            <a:schemeClr val="accent1"/>
+          </a:effectRef>
+          <a:fontRef idx="minor">
+            <a:schemeClr val="dk1"/>
+          </a:fontRef>
+        </p:style>
+        <p:txBody>
+          <a:bodyPr rtlCol="0" anchor="ctr"/>
+          <a:lstStyle/>
+          <a:p>
+            <a:pPr algn="ctr"/>
+            <a:r>
+              <a:rPr lang="en-US" altLang="zh-CN" dirty="0" smtClean="0"/>
+              <a:t>Index: 6</a:t>
+            </a:r>
+          </a:p>
+          <a:p>
+            <a:pPr algn="ctr"/>
+            <a:r>
+              <a:rPr lang="en-US" altLang="zh-CN" dirty="0" smtClean="0"/>
+              <a:t>Value: 3</a:t>
+            </a:r>
+          </a:p>
+        </p:txBody>
+      </p:sp>
+      <p:cxnSp>
+        <p:nvCxnSpPr>
+          <p:cNvPr id="16" name="直接连接符 15"/>
+          <p:cNvCxnSpPr>
+            <a:stCxn id="4" idx="4"/>
+            <a:endCxn id="5" idx="0"/>
+          </p:cNvCxnSpPr>
+          <p:nvPr/>
+        </p:nvCxnSpPr>
+        <p:spPr>
+          <a:xfrm flipH="1">
+            <a:off x="2951820" y="2780928"/>
+            <a:ext cx="1584176" cy="648072"/>
+          </a:xfrm>
+          <a:prstGeom prst="line">
+            <a:avLst/>
+          </a:prstGeom>
+        </p:spPr>
+        <p:style>
+          <a:lnRef idx="1">
+            <a:schemeClr val="accent1"/>
+          </a:lnRef>
+          <a:fillRef idx="0">
+            <a:schemeClr val="accent1"/>
+          </a:fillRef>
+          <a:effectRef idx="0">
+            <a:schemeClr val="accent1"/>
+          </a:effectRef>
+          <a:fontRef idx="minor">
+            <a:schemeClr val="tx1"/>
+          </a:fontRef>
+        </p:style>
+      </p:cxnSp>
+      <p:cxnSp>
+        <p:nvCxnSpPr>
+          <p:cNvPr id="18" name="直接连接符 17"/>
+          <p:cNvCxnSpPr>
+            <a:stCxn id="5" idx="4"/>
+            <a:endCxn id="8" idx="0"/>
+          </p:cNvCxnSpPr>
+          <p:nvPr/>
+        </p:nvCxnSpPr>
+        <p:spPr>
+          <a:xfrm flipH="1">
+            <a:off x="1727684" y="4149080"/>
+            <a:ext cx="1224136" cy="936104"/>
+          </a:xfrm>
+          <a:prstGeom prst="line">
+            <a:avLst/>
+          </a:prstGeom>
+        </p:spPr>
+        <p:style>
+          <a:lnRef idx="1">
+            <a:schemeClr val="accent1"/>
+          </a:lnRef>
+          <a:fillRef idx="0">
+            <a:schemeClr val="accent1"/>
+          </a:fillRef>
+          <a:effectRef idx="0">
+            <a:schemeClr val="accent1"/>
+          </a:effectRef>
+          <a:fontRef idx="minor">
+            <a:schemeClr val="tx1"/>
+          </a:fontRef>
+        </p:style>
+      </p:cxnSp>
+      <p:cxnSp>
+        <p:nvCxnSpPr>
+          <p:cNvPr id="20" name="直接连接符 19"/>
+          <p:cNvCxnSpPr>
+            <a:stCxn id="5" idx="4"/>
+            <a:endCxn id="9" idx="0"/>
+          </p:cNvCxnSpPr>
+          <p:nvPr/>
+        </p:nvCxnSpPr>
+        <p:spPr>
+          <a:xfrm>
+            <a:off x="2951820" y="4149080"/>
+            <a:ext cx="648072" cy="1008112"/>
+          </a:xfrm>
+          <a:prstGeom prst="line">
+            <a:avLst/>
+          </a:prstGeom>
+        </p:spPr>
+        <p:style>
+          <a:lnRef idx="1">
+            <a:schemeClr val="accent1"/>
+          </a:lnRef>
+          <a:fillRef idx="0">
+            <a:schemeClr val="accent1"/>
+          </a:fillRef>
+          <a:effectRef idx="0">
+            <a:schemeClr val="accent1"/>
+          </a:effectRef>
+          <a:fontRef idx="minor">
+            <a:schemeClr val="tx1"/>
+          </a:fontRef>
+        </p:style>
+      </p:cxnSp>
+      <p:cxnSp>
+        <p:nvCxnSpPr>
+          <p:cNvPr id="22" name="直接连接符 21"/>
+          <p:cNvCxnSpPr>
+            <a:stCxn id="6" idx="4"/>
+            <a:endCxn id="10" idx="0"/>
+          </p:cNvCxnSpPr>
+          <p:nvPr/>
+        </p:nvCxnSpPr>
+        <p:spPr>
+          <a:xfrm flipH="1">
+            <a:off x="5544108" y="4293096"/>
+            <a:ext cx="720080" cy="720080"/>
+          </a:xfrm>
+          <a:prstGeom prst="line">
+            <a:avLst/>
+          </a:prstGeom>
+        </p:spPr>
+        <p:style>
+          <a:lnRef idx="1">
+            <a:schemeClr val="accent1"/>
+          </a:lnRef>
+          <a:fillRef idx="0">
+            <a:schemeClr val="accent1"/>
+          </a:fillRef>
+          <a:effectRef idx="0">
+            <a:schemeClr val="accent1"/>
+          </a:effectRef>
+          <a:fontRef idx="minor">
+            <a:schemeClr val="tx1"/>
+          </a:fontRef>
+        </p:style>
+      </p:cxnSp>
+      <p:cxnSp>
+        <p:nvCxnSpPr>
+          <p:cNvPr id="26" name="直接连接符 25"/>
+          <p:cNvCxnSpPr>
+            <a:stCxn id="4" idx="4"/>
+            <a:endCxn id="6" idx="0"/>
+          </p:cNvCxnSpPr>
+          <p:nvPr/>
+        </p:nvCxnSpPr>
+        <p:spPr>
+          <a:xfrm>
+            <a:off x="4535996" y="2780928"/>
+            <a:ext cx="1728192" cy="792088"/>
+          </a:xfrm>
+          <a:prstGeom prst="line">
+            <a:avLst/>
+          </a:prstGeom>
+        </p:spPr>
+        <p:style>
+          <a:lnRef idx="1">
+            <a:schemeClr val="accent1"/>
+          </a:lnRef>
+          <a:fillRef idx="0">
+            <a:schemeClr val="accent1"/>
+          </a:fillRef>
+          <a:effectRef idx="0">
+            <a:schemeClr val="accent1"/>
+          </a:effectRef>
+          <a:fontRef idx="minor">
+            <a:schemeClr val="tx1"/>
+          </a:fontRef>
+        </p:style>
+      </p:cxnSp>
+      <p:sp>
+        <p:nvSpPr>
+          <p:cNvPr id="25" name="标题 24"/>
+          <p:cNvSpPr>
+            <a:spLocks noGrp="1"/>
+          </p:cNvSpPr>
+          <p:nvPr>
+            <p:ph type="title"/>
+          </p:nvPr>
+        </p:nvSpPr>
+        <p:spPr/>
+        <p:txBody>
+          <a:bodyPr/>
+          <a:lstStyle/>
+          <a:p>
+            <a:r>
+              <a:rPr lang="en-US" altLang="zh-CN" dirty="0" smtClean="0"/>
+              <a:t>Max Heap</a:t>
             </a:r>
             <a:endParaRPr lang="zh-CN" altLang="en-US" dirty="0"/>
           </a:p>
@@ -3896,20 +3598,8 @@
             <a:pPr algn="ctr"/>
             <a:r>
               <a:rPr lang="en-US" altLang="zh-CN" dirty="0" smtClean="0"/>
-              <a:t>Index: 1</a:t>
-            </a:r>
-          </a:p>
-          <a:p>
-            <a:pPr algn="ctr"/>
-            <a:r>
-              <a:rPr lang="en-US" altLang="zh-CN" dirty="0" smtClean="0"/>
-              <a:t>Value: </a:t>
-            </a:r>
-            <a:r>
-              <a:rPr lang="en-US" altLang="zh-CN" dirty="0" smtClean="0"/>
               <a:t>6</a:t>
             </a:r>
-            <a:endParaRPr lang="en-US" altLang="zh-CN" dirty="0" smtClean="0"/>
           </a:p>
         </p:txBody>
       </p:sp>
@@ -3949,25 +3639,8 @@
             <a:pPr algn="ctr"/>
             <a:r>
               <a:rPr lang="en-US" altLang="zh-CN" dirty="0" smtClean="0"/>
-              <a:t>Index: </a:t>
-            </a:r>
-            <a:r>
-              <a:rPr lang="en-US" altLang="zh-CN" dirty="0" smtClean="0"/>
-              <a:t>2</a:t>
-            </a:r>
-            <a:endParaRPr lang="en-US" altLang="zh-CN" dirty="0" smtClean="0"/>
-          </a:p>
-          <a:p>
-            <a:pPr algn="ctr"/>
-            <a:r>
-              <a:rPr lang="en-US" altLang="zh-CN" dirty="0" smtClean="0"/>
-              <a:t>Value: </a:t>
-            </a:r>
-            <a:r>
-              <a:rPr lang="en-US" altLang="zh-CN" dirty="0" smtClean="0"/>
-              <a:t>4</a:t>
-            </a:r>
-            <a:endParaRPr lang="en-US" altLang="zh-CN" dirty="0" smtClean="0"/>
+              <a:t>3</a:t>
+            </a:r>
           </a:p>
         </p:txBody>
       </p:sp>
@@ -4007,25 +3680,8 @@
             <a:pPr algn="ctr"/>
             <a:r>
               <a:rPr lang="en-US" altLang="zh-CN" dirty="0" smtClean="0"/>
-              <a:t>Index: </a:t>
-            </a:r>
-            <a:r>
-              <a:rPr lang="en-US" altLang="zh-CN" dirty="0" smtClean="0"/>
-              <a:t>3</a:t>
-            </a:r>
-            <a:endParaRPr lang="en-US" altLang="zh-CN" dirty="0" smtClean="0"/>
-          </a:p>
-          <a:p>
-            <a:pPr algn="ctr"/>
-            <a:r>
-              <a:rPr lang="en-US" altLang="zh-CN" dirty="0" smtClean="0"/>
-              <a:t>Value: </a:t>
-            </a:r>
-            <a:r>
-              <a:rPr lang="en-US" altLang="zh-CN" dirty="0" smtClean="0"/>
-              <a:t>5</a:t>
-            </a:r>
-            <a:endParaRPr lang="en-US" altLang="zh-CN" dirty="0" smtClean="0"/>
+              <a:t>8</a:t>
+            </a:r>
           </a:p>
         </p:txBody>
       </p:sp>
@@ -4065,25 +3721,8 @@
             <a:pPr algn="ctr"/>
             <a:r>
               <a:rPr lang="en-US" altLang="zh-CN" dirty="0" smtClean="0"/>
-              <a:t>Index: </a:t>
-            </a:r>
-            <a:r>
-              <a:rPr lang="en-US" altLang="zh-CN" dirty="0" smtClean="0"/>
-              <a:t>4</a:t>
-            </a:r>
-            <a:endParaRPr lang="en-US" altLang="zh-CN" dirty="0" smtClean="0"/>
-          </a:p>
-          <a:p>
-            <a:pPr algn="ctr"/>
-            <a:r>
-              <a:rPr lang="en-US" altLang="zh-CN" dirty="0" smtClean="0"/>
-              <a:t>Value: </a:t>
-            </a:r>
-            <a:r>
-              <a:rPr lang="en-US" altLang="zh-CN" dirty="0" smtClean="0"/>
-              <a:t>1</a:t>
-            </a:r>
-            <a:endParaRPr lang="en-US" altLang="zh-CN" dirty="0" smtClean="0"/>
+              <a:t>0</a:t>
+            </a:r>
           </a:p>
         </p:txBody>
       </p:sp>
@@ -4123,25 +3762,8 @@
             <a:pPr algn="ctr"/>
             <a:r>
               <a:rPr lang="en-US" altLang="zh-CN" dirty="0" smtClean="0"/>
-              <a:t>Index: </a:t>
-            </a:r>
-            <a:r>
-              <a:rPr lang="en-US" altLang="zh-CN" dirty="0" smtClean="0"/>
-              <a:t>5</a:t>
-            </a:r>
-            <a:endParaRPr lang="en-US" altLang="zh-CN" dirty="0" smtClean="0"/>
-          </a:p>
-          <a:p>
-            <a:pPr algn="ctr"/>
-            <a:r>
-              <a:rPr lang="en-US" altLang="zh-CN" dirty="0" smtClean="0"/>
-              <a:t>Value: </a:t>
-            </a:r>
-            <a:r>
-              <a:rPr lang="en-US" altLang="zh-CN" dirty="0" smtClean="0"/>
-              <a:t>2</a:t>
-            </a:r>
-            <a:endParaRPr lang="en-US" altLang="zh-CN" dirty="0" smtClean="0"/>
+              <a:t>4</a:t>
+            </a:r>
           </a:p>
         </p:txBody>
       </p:sp>
@@ -4181,25 +3803,8 @@
             <a:pPr algn="ctr"/>
             <a:r>
               <a:rPr lang="en-US" altLang="zh-CN" dirty="0" smtClean="0"/>
-              <a:t>Index: </a:t>
-            </a:r>
-            <a:r>
-              <a:rPr lang="en-US" altLang="zh-CN" dirty="0" smtClean="0"/>
-              <a:t>6</a:t>
-            </a:r>
-            <a:endParaRPr lang="en-US" altLang="zh-CN" dirty="0" smtClean="0"/>
-          </a:p>
-          <a:p>
-            <a:pPr algn="ctr"/>
-            <a:r>
-              <a:rPr lang="en-US" altLang="zh-CN" dirty="0" smtClean="0"/>
-              <a:t>Value: </a:t>
-            </a:r>
-            <a:r>
-              <a:rPr lang="en-US" altLang="zh-CN" dirty="0" smtClean="0"/>
-              <a:t>3</a:t>
-            </a:r>
-            <a:endParaRPr lang="en-US" altLang="zh-CN" dirty="0" smtClean="0"/>
+              <a:t>7</a:t>
+            </a:r>
           </a:p>
         </p:txBody>
       </p:sp>
@@ -4385,12 +3990,657 @@
           <a:p>
             <a:r>
               <a:rPr lang="en-US" altLang="zh-CN" dirty="0" smtClean="0"/>
-              <a:t>Max Heap</a:t>
+              <a:t>BST</a:t>
             </a:r>
             <a:endParaRPr lang="zh-CN" altLang="en-US" dirty="0"/>
           </a:p>
         </p:txBody>
       </p:sp>
+      <p:sp>
+        <p:nvSpPr>
+          <p:cNvPr id="19" name="椭圆 18"/>
+          <p:cNvSpPr/>
+          <p:nvPr/>
+        </p:nvSpPr>
+        <p:spPr>
+          <a:xfrm>
+            <a:off x="6876256" y="5085184"/>
+            <a:ext cx="1512168" cy="720080"/>
+          </a:xfrm>
+          <a:prstGeom prst="ellipse">
+            <a:avLst/>
+          </a:prstGeom>
+        </p:spPr>
+        <p:style>
+          <a:lnRef idx="2">
+            <a:schemeClr val="accent1"/>
+          </a:lnRef>
+          <a:fillRef idx="1">
+            <a:schemeClr val="lt1"/>
+          </a:fillRef>
+          <a:effectRef idx="0">
+            <a:schemeClr val="accent1"/>
+          </a:effectRef>
+          <a:fontRef idx="minor">
+            <a:schemeClr val="dk1"/>
+          </a:fontRef>
+        </p:style>
+        <p:txBody>
+          <a:bodyPr rtlCol="0" anchor="ctr"/>
+          <a:lstStyle/>
+          <a:p>
+            <a:pPr algn="ctr"/>
+            <a:r>
+              <a:rPr lang="en-US" altLang="zh-CN" dirty="0" smtClean="0"/>
+              <a:t>11</a:t>
+            </a:r>
+          </a:p>
+        </p:txBody>
+      </p:sp>
+      <p:cxnSp>
+        <p:nvCxnSpPr>
+          <p:cNvPr id="21" name="直接连接符 20"/>
+          <p:cNvCxnSpPr>
+            <a:stCxn id="6" idx="4"/>
+            <a:endCxn id="19" idx="0"/>
+          </p:cNvCxnSpPr>
+          <p:nvPr/>
+        </p:nvCxnSpPr>
+        <p:spPr>
+          <a:xfrm>
+            <a:off x="6264188" y="4293096"/>
+            <a:ext cx="1368152" cy="792088"/>
+          </a:xfrm>
+          <a:prstGeom prst="line">
+            <a:avLst/>
+          </a:prstGeom>
+        </p:spPr>
+        <p:style>
+          <a:lnRef idx="1">
+            <a:schemeClr val="accent1"/>
+          </a:lnRef>
+          <a:fillRef idx="0">
+            <a:schemeClr val="accent1"/>
+          </a:fillRef>
+          <a:effectRef idx="0">
+            <a:schemeClr val="accent1"/>
+          </a:effectRef>
+          <a:fontRef idx="minor">
+            <a:schemeClr val="tx1"/>
+          </a:fontRef>
+        </p:style>
+      </p:cxnSp>
+    </p:spTree>
+  </p:cSld>
+  <p:clrMapOvr>
+    <a:masterClrMapping/>
+  </p:clrMapOvr>
+</p:sld>
+</file>
+
+<file path=ppt/slides/slide3.xml><?xml version="1.0" encoding="utf-8"?>
+<p:sld xmlns:a="http://schemas.openxmlformats.org/drawingml/2006/main" xmlns:r="http://schemas.openxmlformats.org/officeDocument/2006/relationships" xmlns:p="http://schemas.openxmlformats.org/presentationml/2006/main">
+  <p:cSld>
+    <p:spTree>
+      <p:nvGrpSpPr>
+        <p:cNvPr id="1" name=""/>
+        <p:cNvGrpSpPr/>
+        <p:nvPr/>
+      </p:nvGrpSpPr>
+      <p:grpSpPr>
+        <a:xfrm>
+          <a:off x="0" y="0"/>
+          <a:ext cx="0" cy="0"/>
+          <a:chOff x="0" y="0"/>
+          <a:chExt cx="0" cy="0"/>
+        </a:xfrm>
+      </p:grpSpPr>
+      <p:sp>
+        <p:nvSpPr>
+          <p:cNvPr id="27" name="标题 24"/>
+          <p:cNvSpPr txBox="1">
+            <a:spLocks/>
+          </p:cNvSpPr>
+          <p:nvPr/>
+        </p:nvSpPr>
+        <p:spPr>
+          <a:xfrm>
+            <a:off x="457200" y="274638"/>
+            <a:ext cx="8229600" cy="1143000"/>
+          </a:xfrm>
+          <a:prstGeom prst="rect">
+            <a:avLst/>
+          </a:prstGeom>
+        </p:spPr>
+        <p:txBody>
+          <a:bodyPr/>
+          <a:lstStyle/>
+          <a:p>
+            <a:pPr algn="ctr"/>
+            <a:r>
+              <a:rPr lang="en-US" altLang="zh-CN" sz="4400" dirty="0" smtClean="0"/>
+              <a:t>KD-Tree</a:t>
+            </a:r>
+            <a:endParaRPr lang="en-US" altLang="zh-CN" sz="4400" dirty="0"/>
+          </a:p>
+        </p:txBody>
+      </p:sp>
+      <p:sp>
+        <p:nvSpPr>
+          <p:cNvPr id="29" name="椭圆 28"/>
+          <p:cNvSpPr/>
+          <p:nvPr/>
+        </p:nvSpPr>
+        <p:spPr>
+          <a:xfrm>
+            <a:off x="3779912" y="2060848"/>
+            <a:ext cx="1512168" cy="720080"/>
+          </a:xfrm>
+          <a:prstGeom prst="ellipse">
+            <a:avLst/>
+          </a:prstGeom>
+        </p:spPr>
+        <p:style>
+          <a:lnRef idx="2">
+            <a:schemeClr val="accent1"/>
+          </a:lnRef>
+          <a:fillRef idx="1">
+            <a:schemeClr val="lt1"/>
+          </a:fillRef>
+          <a:effectRef idx="0">
+            <a:schemeClr val="accent1"/>
+          </a:effectRef>
+          <a:fontRef idx="minor">
+            <a:schemeClr val="dk1"/>
+          </a:fontRef>
+        </p:style>
+        <p:txBody>
+          <a:bodyPr rtlCol="0" anchor="ctr"/>
+          <a:lstStyle/>
+          <a:p>
+            <a:pPr algn="ctr"/>
+            <a:r>
+              <a:rPr lang="en-US" altLang="zh-CN" dirty="0" smtClean="0"/>
+              <a:t>[</a:t>
+            </a:r>
+            <a:r>
+              <a:rPr lang="en-US" altLang="zh-CN" b="1" dirty="0" smtClean="0"/>
+              <a:t>6</a:t>
+            </a:r>
+            <a:r>
+              <a:rPr lang="en-US" altLang="zh-CN" dirty="0" smtClean="0"/>
+              <a:t>, 2]</a:t>
+            </a:r>
+            <a:endParaRPr lang="en-US" altLang="zh-CN" dirty="0" smtClean="0"/>
+          </a:p>
+        </p:txBody>
+      </p:sp>
+      <p:sp>
+        <p:nvSpPr>
+          <p:cNvPr id="31" name="椭圆 30"/>
+          <p:cNvSpPr/>
+          <p:nvPr/>
+        </p:nvSpPr>
+        <p:spPr>
+          <a:xfrm>
+            <a:off x="2195736" y="3429000"/>
+            <a:ext cx="1512168" cy="720080"/>
+          </a:xfrm>
+          <a:prstGeom prst="ellipse">
+            <a:avLst/>
+          </a:prstGeom>
+        </p:spPr>
+        <p:style>
+          <a:lnRef idx="2">
+            <a:schemeClr val="accent1"/>
+          </a:lnRef>
+          <a:fillRef idx="1">
+            <a:schemeClr val="lt1"/>
+          </a:fillRef>
+          <a:effectRef idx="0">
+            <a:schemeClr val="accent1"/>
+          </a:effectRef>
+          <a:fontRef idx="minor">
+            <a:schemeClr val="dk1"/>
+          </a:fontRef>
+        </p:style>
+        <p:txBody>
+          <a:bodyPr rtlCol="0" anchor="ctr"/>
+          <a:lstStyle/>
+          <a:p>
+            <a:pPr algn="ctr"/>
+            <a:r>
+              <a:rPr lang="en-US" altLang="zh-CN" dirty="0" smtClean="0"/>
+              <a:t>[3, </a:t>
+            </a:r>
+            <a:r>
+              <a:rPr lang="en-US" altLang="zh-CN" b="1" dirty="0" smtClean="0"/>
+              <a:t>5</a:t>
+            </a:r>
+            <a:r>
+              <a:rPr lang="en-US" altLang="zh-CN" dirty="0" smtClean="0"/>
+              <a:t>]</a:t>
+            </a:r>
+            <a:endParaRPr lang="en-US" altLang="zh-CN" dirty="0" smtClean="0"/>
+          </a:p>
+        </p:txBody>
+      </p:sp>
+      <p:sp>
+        <p:nvSpPr>
+          <p:cNvPr id="32" name="椭圆 31"/>
+          <p:cNvSpPr/>
+          <p:nvPr/>
+        </p:nvSpPr>
+        <p:spPr>
+          <a:xfrm>
+            <a:off x="5508104" y="3573016"/>
+            <a:ext cx="1512168" cy="720080"/>
+          </a:xfrm>
+          <a:prstGeom prst="ellipse">
+            <a:avLst/>
+          </a:prstGeom>
+        </p:spPr>
+        <p:style>
+          <a:lnRef idx="2">
+            <a:schemeClr val="accent1"/>
+          </a:lnRef>
+          <a:fillRef idx="1">
+            <a:schemeClr val="lt1"/>
+          </a:fillRef>
+          <a:effectRef idx="0">
+            <a:schemeClr val="accent1"/>
+          </a:effectRef>
+          <a:fontRef idx="minor">
+            <a:schemeClr val="dk1"/>
+          </a:fontRef>
+        </p:style>
+        <p:txBody>
+          <a:bodyPr rtlCol="0" anchor="ctr"/>
+          <a:lstStyle/>
+          <a:p>
+            <a:pPr algn="ctr"/>
+            <a:r>
+              <a:rPr lang="en-US" altLang="zh-CN" dirty="0" smtClean="0"/>
+              <a:t>[8, </a:t>
+            </a:r>
+            <a:r>
+              <a:rPr lang="en-US" altLang="zh-CN" b="1" dirty="0" smtClean="0"/>
+              <a:t>1</a:t>
+            </a:r>
+            <a:r>
+              <a:rPr lang="en-US" altLang="zh-CN" dirty="0" smtClean="0"/>
+              <a:t>]</a:t>
+            </a:r>
+            <a:endParaRPr lang="en-US" altLang="zh-CN" dirty="0" smtClean="0"/>
+          </a:p>
+        </p:txBody>
+      </p:sp>
+      <p:sp>
+        <p:nvSpPr>
+          <p:cNvPr id="34" name="椭圆 33"/>
+          <p:cNvSpPr/>
+          <p:nvPr/>
+        </p:nvSpPr>
+        <p:spPr>
+          <a:xfrm>
+            <a:off x="971600" y="5085184"/>
+            <a:ext cx="1512168" cy="720080"/>
+          </a:xfrm>
+          <a:prstGeom prst="ellipse">
+            <a:avLst/>
+          </a:prstGeom>
+        </p:spPr>
+        <p:style>
+          <a:lnRef idx="2">
+            <a:schemeClr val="accent1"/>
+          </a:lnRef>
+          <a:fillRef idx="1">
+            <a:schemeClr val="lt1"/>
+          </a:fillRef>
+          <a:effectRef idx="0">
+            <a:schemeClr val="accent1"/>
+          </a:effectRef>
+          <a:fontRef idx="minor">
+            <a:schemeClr val="dk1"/>
+          </a:fontRef>
+        </p:style>
+        <p:txBody>
+          <a:bodyPr rtlCol="0" anchor="ctr"/>
+          <a:lstStyle/>
+          <a:p>
+            <a:pPr algn="ctr"/>
+            <a:r>
+              <a:rPr lang="en-US" altLang="zh-CN" dirty="0" smtClean="0"/>
+              <a:t>[6, 3]</a:t>
+            </a:r>
+            <a:endParaRPr lang="en-US" altLang="zh-CN" dirty="0" smtClean="0"/>
+          </a:p>
+        </p:txBody>
+      </p:sp>
+      <p:sp>
+        <p:nvSpPr>
+          <p:cNvPr id="35" name="椭圆 34"/>
+          <p:cNvSpPr/>
+          <p:nvPr/>
+        </p:nvSpPr>
+        <p:spPr>
+          <a:xfrm>
+            <a:off x="2843808" y="5157192"/>
+            <a:ext cx="1512168" cy="720080"/>
+          </a:xfrm>
+          <a:prstGeom prst="ellipse">
+            <a:avLst/>
+          </a:prstGeom>
+        </p:spPr>
+        <p:style>
+          <a:lnRef idx="2">
+            <a:schemeClr val="accent1"/>
+          </a:lnRef>
+          <a:fillRef idx="1">
+            <a:schemeClr val="lt1"/>
+          </a:fillRef>
+          <a:effectRef idx="0">
+            <a:schemeClr val="accent1"/>
+          </a:effectRef>
+          <a:fontRef idx="minor">
+            <a:schemeClr val="dk1"/>
+          </a:fontRef>
+        </p:style>
+        <p:txBody>
+          <a:bodyPr rtlCol="0" anchor="ctr"/>
+          <a:lstStyle/>
+          <a:p>
+            <a:pPr algn="ctr"/>
+            <a:r>
+              <a:rPr lang="en-US" altLang="zh-CN" dirty="0" smtClean="0"/>
+              <a:t>[4, 9]</a:t>
+            </a:r>
+            <a:endParaRPr lang="en-US" altLang="zh-CN" dirty="0" smtClean="0"/>
+          </a:p>
+        </p:txBody>
+      </p:sp>
+      <p:sp>
+        <p:nvSpPr>
+          <p:cNvPr id="36" name="椭圆 35"/>
+          <p:cNvSpPr/>
+          <p:nvPr/>
+        </p:nvSpPr>
+        <p:spPr>
+          <a:xfrm>
+            <a:off x="4788024" y="5013176"/>
+            <a:ext cx="1512168" cy="720080"/>
+          </a:xfrm>
+          <a:prstGeom prst="ellipse">
+            <a:avLst/>
+          </a:prstGeom>
+        </p:spPr>
+        <p:style>
+          <a:lnRef idx="2">
+            <a:schemeClr val="accent1"/>
+          </a:lnRef>
+          <a:fillRef idx="1">
+            <a:schemeClr val="lt1"/>
+          </a:fillRef>
+          <a:effectRef idx="0">
+            <a:schemeClr val="accent1"/>
+          </a:effectRef>
+          <a:fontRef idx="minor">
+            <a:schemeClr val="dk1"/>
+          </a:fontRef>
+        </p:style>
+        <p:txBody>
+          <a:bodyPr rtlCol="0" anchor="ctr"/>
+          <a:lstStyle/>
+          <a:p>
+            <a:pPr algn="ctr"/>
+            <a:r>
+              <a:rPr lang="en-US" altLang="zh-CN" dirty="0" smtClean="0"/>
+              <a:t>[5, 0]</a:t>
+            </a:r>
+            <a:endParaRPr lang="en-US" altLang="zh-CN" dirty="0" smtClean="0"/>
+          </a:p>
+        </p:txBody>
+      </p:sp>
+      <p:cxnSp>
+        <p:nvCxnSpPr>
+          <p:cNvPr id="37" name="直接连接符 36"/>
+          <p:cNvCxnSpPr>
+            <a:stCxn id="29" idx="4"/>
+            <a:endCxn id="31" idx="0"/>
+          </p:cNvCxnSpPr>
+          <p:nvPr/>
+        </p:nvCxnSpPr>
+        <p:spPr>
+          <a:xfrm flipH="1">
+            <a:off x="2951820" y="2780928"/>
+            <a:ext cx="1584176" cy="648072"/>
+          </a:xfrm>
+          <a:prstGeom prst="line">
+            <a:avLst/>
+          </a:prstGeom>
+        </p:spPr>
+        <p:style>
+          <a:lnRef idx="1">
+            <a:schemeClr val="accent1"/>
+          </a:lnRef>
+          <a:fillRef idx="0">
+            <a:schemeClr val="accent1"/>
+          </a:fillRef>
+          <a:effectRef idx="0">
+            <a:schemeClr val="accent1"/>
+          </a:effectRef>
+          <a:fontRef idx="minor">
+            <a:schemeClr val="tx1"/>
+          </a:fontRef>
+        </p:style>
+      </p:cxnSp>
+      <p:cxnSp>
+        <p:nvCxnSpPr>
+          <p:cNvPr id="38" name="直接连接符 37"/>
+          <p:cNvCxnSpPr>
+            <a:stCxn id="31" idx="4"/>
+            <a:endCxn id="34" idx="0"/>
+          </p:cNvCxnSpPr>
+          <p:nvPr/>
+        </p:nvCxnSpPr>
+        <p:spPr>
+          <a:xfrm flipH="1">
+            <a:off x="1727684" y="4149080"/>
+            <a:ext cx="1224136" cy="936104"/>
+          </a:xfrm>
+          <a:prstGeom prst="line">
+            <a:avLst/>
+          </a:prstGeom>
+        </p:spPr>
+        <p:style>
+          <a:lnRef idx="1">
+            <a:schemeClr val="accent1"/>
+          </a:lnRef>
+          <a:fillRef idx="0">
+            <a:schemeClr val="accent1"/>
+          </a:fillRef>
+          <a:effectRef idx="0">
+            <a:schemeClr val="accent1"/>
+          </a:effectRef>
+          <a:fontRef idx="minor">
+            <a:schemeClr val="tx1"/>
+          </a:fontRef>
+        </p:style>
+      </p:cxnSp>
+      <p:cxnSp>
+        <p:nvCxnSpPr>
+          <p:cNvPr id="39" name="直接连接符 38"/>
+          <p:cNvCxnSpPr>
+            <a:stCxn id="31" idx="4"/>
+            <a:endCxn id="35" idx="0"/>
+          </p:cNvCxnSpPr>
+          <p:nvPr/>
+        </p:nvCxnSpPr>
+        <p:spPr>
+          <a:xfrm>
+            <a:off x="2951820" y="4149080"/>
+            <a:ext cx="648072" cy="1008112"/>
+          </a:xfrm>
+          <a:prstGeom prst="line">
+            <a:avLst/>
+          </a:prstGeom>
+        </p:spPr>
+        <p:style>
+          <a:lnRef idx="1">
+            <a:schemeClr val="accent1"/>
+          </a:lnRef>
+          <a:fillRef idx="0">
+            <a:schemeClr val="accent1"/>
+          </a:fillRef>
+          <a:effectRef idx="0">
+            <a:schemeClr val="accent1"/>
+          </a:effectRef>
+          <a:fontRef idx="minor">
+            <a:schemeClr val="tx1"/>
+          </a:fontRef>
+        </p:style>
+      </p:cxnSp>
+      <p:cxnSp>
+        <p:nvCxnSpPr>
+          <p:cNvPr id="40" name="直接连接符 39"/>
+          <p:cNvCxnSpPr>
+            <a:stCxn id="32" idx="4"/>
+            <a:endCxn id="36" idx="0"/>
+          </p:cNvCxnSpPr>
+          <p:nvPr/>
+        </p:nvCxnSpPr>
+        <p:spPr>
+          <a:xfrm flipH="1">
+            <a:off x="5544108" y="4293096"/>
+            <a:ext cx="720080" cy="720080"/>
+          </a:xfrm>
+          <a:prstGeom prst="line">
+            <a:avLst/>
+          </a:prstGeom>
+        </p:spPr>
+        <p:style>
+          <a:lnRef idx="1">
+            <a:schemeClr val="accent1"/>
+          </a:lnRef>
+          <a:fillRef idx="0">
+            <a:schemeClr val="accent1"/>
+          </a:fillRef>
+          <a:effectRef idx="0">
+            <a:schemeClr val="accent1"/>
+          </a:effectRef>
+          <a:fontRef idx="minor">
+            <a:schemeClr val="tx1"/>
+          </a:fontRef>
+        </p:style>
+      </p:cxnSp>
+      <p:cxnSp>
+        <p:nvCxnSpPr>
+          <p:cNvPr id="41" name="直接连接符 40"/>
+          <p:cNvCxnSpPr>
+            <a:stCxn id="29" idx="4"/>
+            <a:endCxn id="32" idx="0"/>
+          </p:cNvCxnSpPr>
+          <p:nvPr/>
+        </p:nvCxnSpPr>
+        <p:spPr>
+          <a:xfrm>
+            <a:off x="4535996" y="2780928"/>
+            <a:ext cx="1728192" cy="792088"/>
+          </a:xfrm>
+          <a:prstGeom prst="line">
+            <a:avLst/>
+          </a:prstGeom>
+        </p:spPr>
+        <p:style>
+          <a:lnRef idx="1">
+            <a:schemeClr val="accent1"/>
+          </a:lnRef>
+          <a:fillRef idx="0">
+            <a:schemeClr val="accent1"/>
+          </a:fillRef>
+          <a:effectRef idx="0">
+            <a:schemeClr val="accent1"/>
+          </a:effectRef>
+          <a:fontRef idx="minor">
+            <a:schemeClr val="tx1"/>
+          </a:fontRef>
+        </p:style>
+      </p:cxnSp>
+      <p:sp>
+        <p:nvSpPr>
+          <p:cNvPr id="42" name="椭圆 41"/>
+          <p:cNvSpPr/>
+          <p:nvPr/>
+        </p:nvSpPr>
+        <p:spPr>
+          <a:xfrm>
+            <a:off x="6876256" y="5085184"/>
+            <a:ext cx="1512168" cy="720080"/>
+          </a:xfrm>
+          <a:prstGeom prst="ellipse">
+            <a:avLst/>
+          </a:prstGeom>
+        </p:spPr>
+        <p:style>
+          <a:lnRef idx="2">
+            <a:schemeClr val="accent1"/>
+          </a:lnRef>
+          <a:fillRef idx="1">
+            <a:schemeClr val="lt1"/>
+          </a:fillRef>
+          <a:effectRef idx="0">
+            <a:schemeClr val="accent1"/>
+          </a:effectRef>
+          <a:fontRef idx="minor">
+            <a:schemeClr val="dk1"/>
+          </a:fontRef>
+        </p:style>
+        <p:txBody>
+          <a:bodyPr rtlCol="0" anchor="ctr"/>
+          <a:lstStyle/>
+          <a:p>
+            <a:pPr algn="ctr"/>
+            <a:r>
+              <a:rPr lang="en-US" altLang="zh-CN" dirty="0" smtClean="0"/>
+              <a:t>[1, 2]</a:t>
+            </a:r>
+            <a:endParaRPr lang="en-US" altLang="zh-CN" dirty="0" smtClean="0"/>
+          </a:p>
+        </p:txBody>
+      </p:sp>
+      <p:cxnSp>
+        <p:nvCxnSpPr>
+          <p:cNvPr id="43" name="直接连接符 42"/>
+          <p:cNvCxnSpPr>
+            <a:stCxn id="32" idx="4"/>
+            <a:endCxn id="42" idx="0"/>
+          </p:cNvCxnSpPr>
+          <p:nvPr/>
+        </p:nvCxnSpPr>
+        <p:spPr>
+          <a:xfrm>
+            <a:off x="6264188" y="4293096"/>
+            <a:ext cx="1368152" cy="792088"/>
+          </a:xfrm>
+          <a:prstGeom prst="line">
+            <a:avLst/>
+          </a:prstGeom>
+        </p:spPr>
+        <p:style>
+          <a:lnRef idx="1">
+            <a:schemeClr val="accent1"/>
+          </a:lnRef>
+          <a:fillRef idx="0">
+            <a:schemeClr val="accent1"/>
+          </a:fillRef>
+          <a:effectRef idx="0">
+            <a:schemeClr val="accent1"/>
+          </a:effectRef>
+          <a:fontRef idx="minor">
+            <a:schemeClr val="tx1"/>
+          </a:fontRef>
+        </p:style>
+      </p:cxnSp>
     </p:spTree>
   </p:cSld>
   <p:clrMapOvr>

</xml_diff>